<commit_message>
presenting in fornt of CWS
</commit_message>
<xml_diff>
--- a/SCCS-2023-Rmarkdown-workshop.pptx
+++ b/SCCS-2023-Rmarkdown-workshop.pptx
@@ -5,7 +5,7 @@
     <p:sldMasterId id="2147483648" r:id="rId1"/>
   </p:sldMasterIdLst>
   <p:notesMasterIdLst>
-    <p:notesMasterId r:id="rId16"/>
+    <p:notesMasterId r:id="rId18"/>
   </p:notesMasterIdLst>
   <p:sldIdLst>
     <p:sldId id="256" r:id="rId2"/>
@@ -22,6 +22,8 @@
     <p:sldId id="267" r:id="rId13"/>
     <p:sldId id="268" r:id="rId14"/>
     <p:sldId id="269" r:id="rId15"/>
+    <p:sldId id="270" r:id="rId16"/>
+    <p:sldId id="271" r:id="rId17"/>
   </p:sldIdLst>
   <p:sldSz cx="12192000" cy="6858000"/>
   <p:notesSz cx="6858000" cy="9144000"/>
@@ -8795,6 +8797,296 @@
 </p:sld>
 </file>
 
+<file path=ppt/slides/slide15.xml><?xml version="1.0" encoding="utf-8"?>
+<p:sld xmlns:a="http://schemas.openxmlformats.org/drawingml/2006/main" xmlns:r="http://schemas.openxmlformats.org/officeDocument/2006/relationships" xmlns:p="http://schemas.openxmlformats.org/presentationml/2006/main">
+  <p:cSld>
+    <p:spTree>
+      <p:nvGrpSpPr>
+        <p:cNvPr id="1" name=""/>
+        <p:cNvGrpSpPr/>
+        <p:nvPr/>
+      </p:nvGrpSpPr>
+      <p:grpSpPr>
+        <a:xfrm>
+          <a:off x="0" y="0"/>
+          <a:ext cx="0" cy="0"/>
+          <a:chOff x="0" y="0"/>
+          <a:chExt cx="0" cy="0"/>
+        </a:xfrm>
+      </p:grpSpPr>
+      <p:sp>
+        <p:nvSpPr>
+          <p:cNvPr id="2" name="Title 1">
+            <a:extLst>
+              <a:ext uri="{FF2B5EF4-FFF2-40B4-BE49-F238E27FC236}">
+                <a16:creationId xmlns:a16="http://schemas.microsoft.com/office/drawing/2014/main" id="{5E6E2D87-1C9B-32CA-0FBB-D60D376B3E46}"/>
+              </a:ext>
+            </a:extLst>
+          </p:cNvPr>
+          <p:cNvSpPr>
+            <a:spLocks noGrp="1"/>
+          </p:cNvSpPr>
+          <p:nvPr>
+            <p:ph type="title"/>
+          </p:nvPr>
+        </p:nvSpPr>
+        <p:spPr/>
+        <p:txBody>
+          <a:bodyPr/>
+          <a:lstStyle/>
+          <a:p>
+            <a:r>
+              <a:rPr lang="en-IN" dirty="0"/>
+              <a:t>Simple document with basic ops	</a:t>
+            </a:r>
+          </a:p>
+        </p:txBody>
+      </p:sp>
+      <p:sp>
+        <p:nvSpPr>
+          <p:cNvPr id="3" name="Content Placeholder 2">
+            <a:extLst>
+              <a:ext uri="{FF2B5EF4-FFF2-40B4-BE49-F238E27FC236}">
+                <a16:creationId xmlns:a16="http://schemas.microsoft.com/office/drawing/2014/main" id="{F707D2B1-65CE-8011-61BB-13575B88DBB4}"/>
+              </a:ext>
+            </a:extLst>
+          </p:cNvPr>
+          <p:cNvSpPr>
+            <a:spLocks noGrp="1"/>
+          </p:cNvSpPr>
+          <p:nvPr>
+            <p:ph idx="1"/>
+          </p:nvPr>
+        </p:nvSpPr>
+        <p:spPr/>
+        <p:txBody>
+          <a:bodyPr/>
+          <a:lstStyle/>
+          <a:p>
+            <a:r>
+              <a:rPr lang="en-IN" dirty="0"/>
+              <a:t>Heading</a:t>
+            </a:r>
+          </a:p>
+          <a:p>
+            <a:r>
+              <a:rPr lang="en-IN" dirty="0"/>
+              <a:t>Bold and italics</a:t>
+            </a:r>
+          </a:p>
+          <a:p>
+            <a:r>
+              <a:rPr lang="en-IN" dirty="0"/>
+              <a:t>Superscript and subscript</a:t>
+            </a:r>
+          </a:p>
+          <a:p>
+            <a:r>
+              <a:rPr lang="en-IN" dirty="0"/>
+              <a:t>Including or excluding the codes and warning</a:t>
+            </a:r>
+          </a:p>
+          <a:p>
+            <a:r>
+              <a:rPr lang="en-IN" dirty="0"/>
+              <a:t>Addition of images </a:t>
+            </a:r>
+          </a:p>
+          <a:p>
+            <a:r>
+              <a:rPr lang="en-IN" dirty="0"/>
+              <a:t>Hyperlinks</a:t>
+            </a:r>
+          </a:p>
+          <a:p>
+            <a:r>
+              <a:rPr lang="en-IN" dirty="0"/>
+              <a:t>Ordered and non-ordered bullet points</a:t>
+            </a:r>
+          </a:p>
+          <a:p>
+            <a:endParaRPr lang="en-IN" dirty="0"/>
+          </a:p>
+          <a:p>
+            <a:endParaRPr lang="en-IN" dirty="0"/>
+          </a:p>
+          <a:p>
+            <a:endParaRPr lang="en-IN" dirty="0"/>
+          </a:p>
+          <a:p>
+            <a:endParaRPr lang="en-IN" dirty="0"/>
+          </a:p>
+        </p:txBody>
+      </p:sp>
+    </p:spTree>
+    <p:extLst>
+      <p:ext uri="{BB962C8B-B14F-4D97-AF65-F5344CB8AC3E}">
+        <p14:creationId xmlns:p14="http://schemas.microsoft.com/office/powerpoint/2010/main" val="2984135740"/>
+      </p:ext>
+    </p:extLst>
+  </p:cSld>
+  <p:clrMapOvr>
+    <a:masterClrMapping/>
+  </p:clrMapOvr>
+</p:sld>
+</file>
+
+<file path=ppt/slides/slide16.xml><?xml version="1.0" encoding="utf-8"?>
+<p:sld xmlns:a="http://schemas.openxmlformats.org/drawingml/2006/main" xmlns:r="http://schemas.openxmlformats.org/officeDocument/2006/relationships" xmlns:p="http://schemas.openxmlformats.org/presentationml/2006/main">
+  <p:cSld>
+    <p:spTree>
+      <p:nvGrpSpPr>
+        <p:cNvPr id="1" name=""/>
+        <p:cNvGrpSpPr/>
+        <p:nvPr/>
+      </p:nvGrpSpPr>
+      <p:grpSpPr>
+        <a:xfrm>
+          <a:off x="0" y="0"/>
+          <a:ext cx="0" cy="0"/>
+          <a:chOff x="0" y="0"/>
+          <a:chExt cx="0" cy="0"/>
+        </a:xfrm>
+      </p:grpSpPr>
+      <p:sp>
+        <p:nvSpPr>
+          <p:cNvPr id="2" name="Title 1">
+            <a:extLst>
+              <a:ext uri="{FF2B5EF4-FFF2-40B4-BE49-F238E27FC236}">
+                <a16:creationId xmlns:a16="http://schemas.microsoft.com/office/drawing/2014/main" id="{3615D8A7-DDE3-93F9-54B5-67CD1ABAB1AD}"/>
+              </a:ext>
+            </a:extLst>
+          </p:cNvPr>
+          <p:cNvSpPr>
+            <a:spLocks noGrp="1"/>
+          </p:cNvSpPr>
+          <p:nvPr>
+            <p:ph type="title"/>
+          </p:nvPr>
+        </p:nvSpPr>
+        <p:spPr/>
+        <p:txBody>
+          <a:bodyPr/>
+          <a:lstStyle/>
+          <a:p>
+            <a:r>
+              <a:rPr lang="en-IN" dirty="0"/>
+              <a:t>Second documents with pdf output</a:t>
+            </a:r>
+          </a:p>
+        </p:txBody>
+      </p:sp>
+      <p:sp>
+        <p:nvSpPr>
+          <p:cNvPr id="3" name="Content Placeholder 2">
+            <a:extLst>
+              <a:ext uri="{FF2B5EF4-FFF2-40B4-BE49-F238E27FC236}">
+                <a16:creationId xmlns:a16="http://schemas.microsoft.com/office/drawing/2014/main" id="{C2D96D29-294E-12CD-E369-33E9C710D382}"/>
+              </a:ext>
+            </a:extLst>
+          </p:cNvPr>
+          <p:cNvSpPr>
+            <a:spLocks noGrp="1"/>
+          </p:cNvSpPr>
+          <p:nvPr>
+            <p:ph idx="1"/>
+          </p:nvPr>
+        </p:nvSpPr>
+        <p:spPr/>
+        <p:txBody>
+          <a:bodyPr>
+            <a:normAutofit lnSpcReduction="10000"/>
+          </a:bodyPr>
+          <a:lstStyle/>
+          <a:p>
+            <a:pPr>
+              <a:lnSpc>
+                <a:spcPct val="150000"/>
+              </a:lnSpc>
+            </a:pPr>
+            <a:r>
+              <a:rPr lang="en-IN" dirty="0"/>
+              <a:t>Inline text</a:t>
+            </a:r>
+          </a:p>
+          <a:p>
+            <a:pPr>
+              <a:lnSpc>
+                <a:spcPct val="150000"/>
+              </a:lnSpc>
+            </a:pPr>
+            <a:r>
+              <a:rPr lang="en-IN" dirty="0"/>
+              <a:t>Inline equation</a:t>
+            </a:r>
+          </a:p>
+          <a:p>
+            <a:pPr>
+              <a:lnSpc>
+                <a:spcPct val="150000"/>
+              </a:lnSpc>
+            </a:pPr>
+            <a:r>
+              <a:rPr lang="en-IN" dirty="0"/>
+              <a:t>Equations</a:t>
+            </a:r>
+          </a:p>
+          <a:p>
+            <a:pPr>
+              <a:lnSpc>
+                <a:spcPct val="150000"/>
+              </a:lnSpc>
+            </a:pPr>
+            <a:r>
+              <a:rPr lang="en-IN" dirty="0"/>
+              <a:t>Citation and citation style in R markdown</a:t>
+            </a:r>
+          </a:p>
+          <a:p>
+            <a:pPr>
+              <a:lnSpc>
+                <a:spcPct val="150000"/>
+              </a:lnSpc>
+            </a:pPr>
+            <a:r>
+              <a:rPr lang="en-IN" dirty="0"/>
+              <a:t>Tables and captions</a:t>
+            </a:r>
+          </a:p>
+          <a:p>
+            <a:pPr>
+              <a:lnSpc>
+                <a:spcPct val="150000"/>
+              </a:lnSpc>
+            </a:pPr>
+            <a:r>
+              <a:rPr lang="en-IN" dirty="0"/>
+              <a:t>Figure and captions. </a:t>
+            </a:r>
+          </a:p>
+          <a:p>
+            <a:pPr>
+              <a:lnSpc>
+                <a:spcPct val="150000"/>
+              </a:lnSpc>
+            </a:pPr>
+            <a:endParaRPr lang="en-IN" dirty="0"/>
+          </a:p>
+        </p:txBody>
+      </p:sp>
+    </p:spTree>
+    <p:extLst>
+      <p:ext uri="{BB962C8B-B14F-4D97-AF65-F5344CB8AC3E}">
+        <p14:creationId xmlns:p14="http://schemas.microsoft.com/office/powerpoint/2010/main" val="1815513555"/>
+      </p:ext>
+    </p:extLst>
+  </p:cSld>
+  <p:clrMapOvr>
+    <a:masterClrMapping/>
+  </p:clrMapOvr>
+</p:sld>
+</file>
+
 <file path=ppt/slides/slide2.xml><?xml version="1.0" encoding="utf-8"?>
 <p:sld xmlns:a="http://schemas.openxmlformats.org/drawingml/2006/main" xmlns:r="http://schemas.openxmlformats.org/officeDocument/2006/relationships" xmlns:p="http://schemas.openxmlformats.org/presentationml/2006/main">
   <p:cSld>
@@ -9864,7 +10156,9 @@
         </p:nvSpPr>
         <p:spPr/>
         <p:txBody>
-          <a:bodyPr/>
+          <a:bodyPr>
+            <a:normAutofit lnSpcReduction="10000"/>
+          </a:bodyPr>
           <a:lstStyle/>
           <a:p>
             <a:pPr>
@@ -9879,6 +10173,17 @@
             <a:r>
               <a:rPr lang="en-US" i="1" dirty="0"/>
               <a:t>Sorry I sent the wrong table)</a:t>
+            </a:r>
+          </a:p>
+          <a:p>
+            <a:pPr>
+              <a:lnSpc>
+                <a:spcPct val="150000"/>
+              </a:lnSpc>
+            </a:pPr>
+            <a:r>
+              <a:rPr lang="en-US" dirty="0"/>
+              <a:t>Integration of other software</a:t>
             </a:r>
           </a:p>
           <a:p>

</xml_diff>

<commit_message>
Final commit before workshop
</commit_message>
<xml_diff>
--- a/SCCS-2023-Rmarkdown-workshop.pptx
+++ b/SCCS-2023-Rmarkdown-workshop.pptx
@@ -5,7 +5,7 @@
     <p:sldMasterId id="2147483648" r:id="rId1"/>
   </p:sldMasterIdLst>
   <p:notesMasterIdLst>
-    <p:notesMasterId r:id="rId18"/>
+    <p:notesMasterId r:id="rId19"/>
   </p:notesMasterIdLst>
   <p:sldIdLst>
     <p:sldId id="256" r:id="rId2"/>
@@ -18,12 +18,13 @@
     <p:sldId id="263" r:id="rId9"/>
     <p:sldId id="264" r:id="rId10"/>
     <p:sldId id="265" r:id="rId11"/>
-    <p:sldId id="266" r:id="rId12"/>
-    <p:sldId id="267" r:id="rId13"/>
-    <p:sldId id="268" r:id="rId14"/>
-    <p:sldId id="269" r:id="rId15"/>
-    <p:sldId id="270" r:id="rId16"/>
-    <p:sldId id="271" r:id="rId17"/>
+    <p:sldId id="272" r:id="rId12"/>
+    <p:sldId id="266" r:id="rId13"/>
+    <p:sldId id="267" r:id="rId14"/>
+    <p:sldId id="268" r:id="rId15"/>
+    <p:sldId id="269" r:id="rId16"/>
+    <p:sldId id="270" r:id="rId17"/>
+    <p:sldId id="271" r:id="rId18"/>
   </p:sldIdLst>
   <p:sldSz cx="12192000" cy="6858000"/>
   <p:notesSz cx="6858000" cy="9144000"/>
@@ -3717,7 +3718,7 @@
           <a:p>
             <a:fld id="{427F92CC-0316-4214-B943-0FF7779937B3}" type="datetimeFigureOut">
               <a:rPr lang="en-US" smtClean="0"/>
-              <a:t>9/21/2023</a:t>
+              <a:t>10/11/2023</a:t>
             </a:fld>
             <a:endParaRPr lang="en-US"/>
           </a:p>
@@ -4387,7 +4388,7 @@
           <a:p>
             <a:fld id="{28B03398-6DAF-499F-8BA9-F22F110BDA64}" type="datetimeFigureOut">
               <a:rPr lang="en-IN" smtClean="0"/>
-              <a:t>21-09-2023</a:t>
+              <a:t>11-10-2023</a:t>
             </a:fld>
             <a:endParaRPr lang="en-IN"/>
           </a:p>
@@ -4613,7 +4614,7 @@
           <a:p>
             <a:fld id="{28B03398-6DAF-499F-8BA9-F22F110BDA64}" type="datetimeFigureOut">
               <a:rPr lang="en-IN" smtClean="0"/>
-              <a:t>21-09-2023</a:t>
+              <a:t>11-10-2023</a:t>
             </a:fld>
             <a:endParaRPr lang="en-IN"/>
           </a:p>
@@ -4829,7 +4830,7 @@
           <a:p>
             <a:fld id="{28B03398-6DAF-499F-8BA9-F22F110BDA64}" type="datetimeFigureOut">
               <a:rPr lang="en-IN" smtClean="0"/>
-              <a:t>21-09-2023</a:t>
+              <a:t>11-10-2023</a:t>
             </a:fld>
             <a:endParaRPr lang="en-IN"/>
           </a:p>
@@ -5121,7 +5122,7 @@
           <a:p>
             <a:fld id="{28B03398-6DAF-499F-8BA9-F22F110BDA64}" type="datetimeFigureOut">
               <a:rPr lang="en-IN" smtClean="0"/>
-              <a:t>21-09-2023</a:t>
+              <a:t>11-10-2023</a:t>
             </a:fld>
             <a:endParaRPr lang="en-IN"/>
           </a:p>
@@ -5405,7 +5406,7 @@
           <a:p>
             <a:fld id="{28B03398-6DAF-499F-8BA9-F22F110BDA64}" type="datetimeFigureOut">
               <a:rPr lang="en-IN" smtClean="0"/>
-              <a:t>21-09-2023</a:t>
+              <a:t>11-10-2023</a:t>
             </a:fld>
             <a:endParaRPr lang="en-IN"/>
           </a:p>
@@ -5836,7 +5837,7 @@
           <a:p>
             <a:fld id="{28B03398-6DAF-499F-8BA9-F22F110BDA64}" type="datetimeFigureOut">
               <a:rPr lang="en-IN" smtClean="0"/>
-              <a:t>21-09-2023</a:t>
+              <a:t>11-10-2023</a:t>
             </a:fld>
             <a:endParaRPr lang="en-IN"/>
           </a:p>
@@ -5994,7 +5995,7 @@
           <a:p>
             <a:fld id="{28B03398-6DAF-499F-8BA9-F22F110BDA64}" type="datetimeFigureOut">
               <a:rPr lang="en-IN" smtClean="0"/>
-              <a:t>21-09-2023</a:t>
+              <a:t>11-10-2023</a:t>
             </a:fld>
             <a:endParaRPr lang="en-IN"/>
           </a:p>
@@ -6123,7 +6124,7 @@
           <a:p>
             <a:fld id="{28B03398-6DAF-499F-8BA9-F22F110BDA64}" type="datetimeFigureOut">
               <a:rPr lang="en-IN" smtClean="0"/>
-              <a:t>21-09-2023</a:t>
+              <a:t>11-10-2023</a:t>
             </a:fld>
             <a:endParaRPr lang="en-IN"/>
           </a:p>
@@ -6452,7 +6453,7 @@
           <a:p>
             <a:fld id="{28B03398-6DAF-499F-8BA9-F22F110BDA64}" type="datetimeFigureOut">
               <a:rPr lang="en-IN" smtClean="0"/>
-              <a:t>21-09-2023</a:t>
+              <a:t>11-10-2023</a:t>
             </a:fld>
             <a:endParaRPr lang="en-IN"/>
           </a:p>
@@ -6757,7 +6758,7 @@
           <a:p>
             <a:fld id="{28B03398-6DAF-499F-8BA9-F22F110BDA64}" type="datetimeFigureOut">
               <a:rPr lang="en-IN" smtClean="0"/>
-              <a:t>21-09-2023</a:t>
+              <a:t>11-10-2023</a:t>
             </a:fld>
             <a:endParaRPr lang="en-IN"/>
           </a:p>
@@ -8288,179 +8289,57 @@
           <a:chExt cx="0" cy="0"/>
         </a:xfrm>
       </p:grpSpPr>
-      <p:sp>
-        <p:nvSpPr>
-          <p:cNvPr id="2" name="Title 1">
-            <a:extLst>
-              <a:ext uri="{FF2B5EF4-FFF2-40B4-BE49-F238E27FC236}">
-                <a16:creationId xmlns:a16="http://schemas.microsoft.com/office/drawing/2014/main" id="{DE19185E-E521-2FF8-7E1B-D2B7489D1679}"/>
-              </a:ext>
-            </a:extLst>
-          </p:cNvPr>
-          <p:cNvSpPr>
-            <a:spLocks noGrp="1"/>
-          </p:cNvSpPr>
-          <p:nvPr>
-            <p:ph type="title"/>
-          </p:nvPr>
-        </p:nvSpPr>
-        <p:spPr/>
-        <p:txBody>
-          <a:bodyPr/>
-          <a:lstStyle/>
-          <a:p>
-            <a:r>
-              <a:rPr lang="en-US" dirty="0"/>
-              <a:t>Setting up RStudio for markdown</a:t>
-            </a:r>
-          </a:p>
-        </p:txBody>
-      </p:sp>
-      <p:sp>
-        <p:nvSpPr>
-          <p:cNvPr id="3" name="Content Placeholder 2">
-            <a:extLst>
-              <a:ext uri="{FF2B5EF4-FFF2-40B4-BE49-F238E27FC236}">
-                <a16:creationId xmlns:a16="http://schemas.microsoft.com/office/drawing/2014/main" id="{577FDE69-F4A2-4A27-4FA9-758214D7E225}"/>
-              </a:ext>
-            </a:extLst>
-          </p:cNvPr>
-          <p:cNvSpPr>
-            <a:spLocks noGrp="1"/>
-          </p:cNvSpPr>
-          <p:nvPr>
-            <p:ph idx="1"/>
-          </p:nvPr>
-        </p:nvSpPr>
-        <p:spPr/>
-        <p:txBody>
-          <a:bodyPr>
-            <a:normAutofit fontScale="92500" lnSpcReduction="10000"/>
-          </a:bodyPr>
-          <a:lstStyle/>
-          <a:p>
-            <a:r>
-              <a:rPr lang="en-US" dirty="0"/>
-              <a:t>Step1: Install R and </a:t>
-            </a:r>
-            <a:r>
-              <a:rPr lang="en-US" dirty="0" err="1"/>
-              <a:t>Rstudio</a:t>
-            </a:r>
-            <a:endParaRPr lang="en-US" dirty="0"/>
-          </a:p>
-          <a:p>
-            <a:r>
-              <a:rPr lang="en-US" dirty="0"/>
-              <a:t>Step2: Install packages</a:t>
-            </a:r>
-          </a:p>
-          <a:p>
-            <a:pPr lvl="1"/>
-            <a:r>
-              <a:rPr lang="en-US" dirty="0"/>
-              <a:t>“</a:t>
-            </a:r>
-            <a:r>
-              <a:rPr lang="en-US" dirty="0" err="1"/>
-              <a:t>rmarkdown</a:t>
-            </a:r>
-            <a:r>
-              <a:rPr lang="en-US" dirty="0"/>
-              <a:t>”</a:t>
-            </a:r>
-          </a:p>
-          <a:p>
-            <a:pPr lvl="1"/>
-            <a:r>
-              <a:rPr lang="en-US" dirty="0"/>
-              <a:t>“</a:t>
-            </a:r>
-            <a:r>
-              <a:rPr lang="en-US" dirty="0" err="1"/>
-              <a:t>knitr</a:t>
-            </a:r>
-            <a:r>
-              <a:rPr lang="en-US" dirty="0"/>
-              <a:t>”</a:t>
-            </a:r>
-          </a:p>
-          <a:p>
-            <a:pPr lvl="1"/>
-            <a:r>
-              <a:rPr lang="en-US" dirty="0"/>
-              <a:t>“</a:t>
-            </a:r>
-            <a:r>
-              <a:rPr lang="en-US" dirty="0" err="1"/>
-              <a:t>TinyTex</a:t>
-            </a:r>
-            <a:r>
-              <a:rPr lang="en-US" dirty="0"/>
-              <a:t> for pdf”</a:t>
-            </a:r>
-          </a:p>
-          <a:p>
-            <a:r>
-              <a:rPr lang="en-US" dirty="0"/>
-              <a:t>In your </a:t>
-            </a:r>
-            <a:r>
-              <a:rPr lang="en-US" dirty="0" err="1"/>
-              <a:t>Rstudio</a:t>
-            </a:r>
-            <a:r>
-              <a:rPr lang="en-US" dirty="0"/>
-              <a:t>, on the menu bar, </a:t>
-            </a:r>
-          </a:p>
-          <a:p>
-            <a:pPr lvl="1"/>
-            <a:r>
-              <a:rPr lang="en-US" dirty="0"/>
-              <a:t>click on the </a:t>
-            </a:r>
-            <a:r>
-              <a:rPr lang="en-US" dirty="0" err="1"/>
-              <a:t>file</a:t>
-            </a:r>
-            <a:r>
-              <a:rPr lang="en-US" dirty="0" err="1">
-                <a:sym typeface="Wingdings" panose="05000000000000000000" pitchFamily="2" charset="2"/>
-              </a:rPr>
-              <a:t>new</a:t>
-            </a:r>
-            <a:r>
-              <a:rPr lang="en-US" dirty="0">
-                <a:sym typeface="Wingdings" panose="05000000000000000000" pitchFamily="2" charset="2"/>
-              </a:rPr>
-              <a:t> file R markdown, to open a pop-up window</a:t>
-            </a:r>
-          </a:p>
-          <a:p>
-            <a:endParaRPr lang="en-US" dirty="0"/>
-          </a:p>
-          <a:p>
-            <a:r>
-              <a:rPr lang="en-US" dirty="0"/>
-              <a:t>Select the option for different document types ( multiple document types can be rendered)</a:t>
-            </a:r>
-          </a:p>
-          <a:p>
-            <a:r>
-              <a:rPr lang="en-US" dirty="0"/>
-              <a:t>Click OK to start the file with .RMD ext. </a:t>
-            </a:r>
-          </a:p>
-          <a:p>
-            <a:endParaRPr lang="en-US" dirty="0"/>
-          </a:p>
-        </p:txBody>
-      </p:sp>
+      <p:pic>
+        <p:nvPicPr>
+          <p:cNvPr id="1026" name="Picture 2" descr="A diagram illustrating how an R Markdown document is converted to the final output document.">
+            <a:extLst>
+              <a:ext uri="{FF2B5EF4-FFF2-40B4-BE49-F238E27FC236}">
+                <a16:creationId xmlns:a16="http://schemas.microsoft.com/office/drawing/2014/main" id="{8F040ADC-B9C7-77AA-2B80-2877C37A6BEA}"/>
+              </a:ext>
+            </a:extLst>
+          </p:cNvPr>
+          <p:cNvPicPr>
+            <a:picLocks noChangeAspect="1" noChangeArrowheads="1"/>
+          </p:cNvPicPr>
+          <p:nvPr/>
+        </p:nvPicPr>
+        <p:blipFill>
+          <a:blip r:embed="rId2">
+            <a:extLst>
+              <a:ext uri="{28A0092B-C50C-407E-A947-70E740481C1C}">
+                <a14:useLocalDpi xmlns:a14="http://schemas.microsoft.com/office/drawing/2010/main" val="0"/>
+              </a:ext>
+            </a:extLst>
+          </a:blip>
+          <a:srcRect/>
+          <a:stretch>
+            <a:fillRect/>
+          </a:stretch>
+        </p:blipFill>
+        <p:spPr bwMode="auto">
+          <a:xfrm>
+            <a:off x="0" y="494521"/>
+            <a:ext cx="10795441" cy="5133457"/>
+          </a:xfrm>
+          <a:prstGeom prst="rect">
+            <a:avLst/>
+          </a:prstGeom>
+          <a:noFill/>
+          <a:extLst>
+            <a:ext uri="{909E8E84-426E-40DD-AFC4-6F175D3DCCD1}">
+              <a14:hiddenFill xmlns:a14="http://schemas.microsoft.com/office/drawing/2010/main">
+                <a:solidFill>
+                  <a:srgbClr val="FFFFFF"/>
+                </a:solidFill>
+              </a14:hiddenFill>
+            </a:ext>
+          </a:extLst>
+        </p:spPr>
+      </p:pic>
     </p:spTree>
     <p:extLst>
       <p:ext uri="{BB962C8B-B14F-4D97-AF65-F5344CB8AC3E}">
-        <p14:creationId xmlns:p14="http://schemas.microsoft.com/office/powerpoint/2010/main" val="2288258770"/>
+        <p14:creationId xmlns:p14="http://schemas.microsoft.com/office/powerpoint/2010/main" val="3417155843"/>
       </p:ext>
     </p:extLst>
   </p:cSld>
@@ -8492,7 +8371,7 @@
           <p:cNvPr id="2" name="Title 1">
             <a:extLst>
               <a:ext uri="{FF2B5EF4-FFF2-40B4-BE49-F238E27FC236}">
-                <a16:creationId xmlns:a16="http://schemas.microsoft.com/office/drawing/2014/main" id="{D5E2A888-4371-2C77-8D70-67C5D2A3E50F}"/>
+                <a16:creationId xmlns:a16="http://schemas.microsoft.com/office/drawing/2014/main" id="{DE19185E-E521-2FF8-7E1B-D2B7489D1679}"/>
               </a:ext>
             </a:extLst>
           </p:cNvPr>
@@ -8510,7 +8389,7 @@
           <a:p>
             <a:r>
               <a:rPr lang="en-US" dirty="0"/>
-              <a:t>Additional documents for help</a:t>
+              <a:t>Setting up RStudio for markdown</a:t>
             </a:r>
           </a:p>
         </p:txBody>
@@ -8520,7 +8399,7 @@
           <p:cNvPr id="3" name="Content Placeholder 2">
             <a:extLst>
               <a:ext uri="{FF2B5EF4-FFF2-40B4-BE49-F238E27FC236}">
-                <a16:creationId xmlns:a16="http://schemas.microsoft.com/office/drawing/2014/main" id="{662CC8F7-1286-E21F-DD90-0B000D5F51C8}"/>
+                <a16:creationId xmlns:a16="http://schemas.microsoft.com/office/drawing/2014/main" id="{577FDE69-F4A2-4A27-4FA9-758214D7E225}"/>
               </a:ext>
             </a:extLst>
           </p:cNvPr>
@@ -8531,62 +8410,127 @@
             <p:ph idx="1"/>
           </p:nvPr>
         </p:nvSpPr>
-        <p:spPr>
-          <a:xfrm>
-            <a:off x="838200" y="1825625"/>
-            <a:ext cx="10064242" cy="2974975"/>
-          </a:xfrm>
-        </p:spPr>
+        <p:spPr/>
         <p:txBody>
-          <a:bodyPr/>
+          <a:bodyPr>
+            <a:normAutofit fontScale="92500" lnSpcReduction="10000"/>
+          </a:bodyPr>
           <a:lstStyle/>
           <a:p>
             <a:r>
               <a:rPr lang="en-US" dirty="0"/>
-              <a:t>R Markdown cheat sheet</a:t>
-            </a:r>
+              <a:t>Step1: Install R and </a:t>
+            </a:r>
+            <a:r>
+              <a:rPr lang="en-US" dirty="0" err="1"/>
+              <a:t>Rstudio</a:t>
+            </a:r>
+            <a:endParaRPr lang="en-US" dirty="0"/>
           </a:p>
           <a:p>
             <a:r>
               <a:rPr lang="en-US" dirty="0"/>
-              <a:t>R Markdown reference manual</a:t>
-            </a:r>
-          </a:p>
-          <a:p>
+              <a:t>Step2: Install packages</a:t>
+            </a:r>
+          </a:p>
+          <a:p>
+            <a:pPr lvl="1"/>
+            <a:r>
+              <a:rPr lang="en-US" dirty="0"/>
+              <a:t>“</a:t>
+            </a:r>
+            <a:r>
+              <a:rPr lang="en-US" dirty="0" err="1"/>
+              <a:t>rmarkdown</a:t>
+            </a:r>
+            <a:r>
+              <a:rPr lang="en-US" dirty="0"/>
+              <a:t>”</a:t>
+            </a:r>
+          </a:p>
+          <a:p>
+            <a:pPr lvl="1"/>
+            <a:r>
+              <a:rPr lang="en-US" dirty="0"/>
+              <a:t>“</a:t>
+            </a:r>
+            <a:r>
+              <a:rPr lang="en-US" dirty="0" err="1"/>
+              <a:t>knitr</a:t>
+            </a:r>
+            <a:r>
+              <a:rPr lang="en-US" dirty="0"/>
+              <a:t>”</a:t>
+            </a:r>
+          </a:p>
+          <a:p>
+            <a:pPr lvl="1"/>
+            <a:r>
+              <a:rPr lang="en-US" dirty="0"/>
+              <a:t>“</a:t>
+            </a:r>
+            <a:r>
+              <a:rPr lang="en-US" dirty="0" err="1"/>
+              <a:t>TinyTex</a:t>
+            </a:r>
+            <a:r>
+              <a:rPr lang="en-US" dirty="0"/>
+              <a:t> for pdf”</a:t>
+            </a:r>
+          </a:p>
+          <a:p>
+            <a:r>
+              <a:rPr lang="en-US" dirty="0"/>
+              <a:t>In your </a:t>
+            </a:r>
+            <a:r>
+              <a:rPr lang="en-US" dirty="0" err="1"/>
+              <a:t>Rstudio</a:t>
+            </a:r>
+            <a:r>
+              <a:rPr lang="en-US" dirty="0"/>
+              <a:t>, on the menu bar, </a:t>
+            </a:r>
+          </a:p>
+          <a:p>
+            <a:pPr lvl="1"/>
+            <a:r>
+              <a:rPr lang="en-US" dirty="0"/>
+              <a:t>click on the </a:t>
+            </a:r>
+            <a:r>
+              <a:rPr lang="en-US" dirty="0" err="1"/>
+              <a:t>file</a:t>
+            </a:r>
+            <a:r>
+              <a:rPr lang="en-US" dirty="0" err="1">
+                <a:sym typeface="Wingdings" panose="05000000000000000000" pitchFamily="2" charset="2"/>
+              </a:rPr>
+              <a:t>new</a:t>
+            </a:r>
             <a:r>
               <a:rPr lang="en-US" dirty="0">
-                <a:hlinkClick r:id="rId2"/>
+                <a:sym typeface="Wingdings" panose="05000000000000000000" pitchFamily="2" charset="2"/>
               </a:rPr>
-              <a:t>Composing reproducible manuscripts using R Markdown | Labs | </a:t>
-            </a:r>
-            <a:r>
-              <a:rPr lang="en-US" dirty="0" err="1">
-                <a:hlinkClick r:id="rId2"/>
-              </a:rPr>
-              <a:t>eLife</a:t>
-            </a:r>
-            <a:r>
-              <a:rPr lang="en-US" dirty="0">
-                <a:hlinkClick r:id="rId2"/>
-              </a:rPr>
-              <a:t> (elifesciences.org)</a:t>
-            </a:r>
+              <a:t> file R markdown, to open a pop-up window</a:t>
+            </a:r>
+          </a:p>
+          <a:p>
             <a:endParaRPr lang="en-US" dirty="0"/>
           </a:p>
           <a:p>
             <a:r>
-              <a:rPr lang="en-IN" dirty="0">
-                <a:hlinkClick r:id="rId3"/>
-              </a:rPr>
-              <a:t>R Markdown: The Definitive Guide (bookdown.org)</a:t>
-            </a:r>
-            <a:endParaRPr lang="en-IN" dirty="0"/>
-          </a:p>
-          <a:p>
-            <a:r>
-              <a:rPr lang="en-IN" dirty="0"/>
-              <a:t>Many more (keeping looking)</a:t>
-            </a:r>
+              <a:rPr lang="en-US" dirty="0"/>
+              <a:t>Select the option for different document types ( multiple document types can be rendered)</a:t>
+            </a:r>
+          </a:p>
+          <a:p>
+            <a:r>
+              <a:rPr lang="en-US" dirty="0"/>
+              <a:t>Click OK to start the file with .RMD ext. </a:t>
+            </a:r>
+          </a:p>
+          <a:p>
             <a:endParaRPr lang="en-US" dirty="0"/>
           </a:p>
         </p:txBody>
@@ -8594,7 +8538,7 @@
     </p:spTree>
     <p:extLst>
       <p:ext uri="{BB962C8B-B14F-4D97-AF65-F5344CB8AC3E}">
-        <p14:creationId xmlns:p14="http://schemas.microsoft.com/office/powerpoint/2010/main" val="3414157185"/>
+        <p14:creationId xmlns:p14="http://schemas.microsoft.com/office/powerpoint/2010/main" val="2288258770"/>
       </p:ext>
     </p:extLst>
   </p:cSld>
@@ -8626,7 +8570,7 @@
           <p:cNvPr id="2" name="Title 1">
             <a:extLst>
               <a:ext uri="{FF2B5EF4-FFF2-40B4-BE49-F238E27FC236}">
-                <a16:creationId xmlns:a16="http://schemas.microsoft.com/office/drawing/2014/main" id="{3DF97B78-35B8-58B0-863F-FF450A62486E}"/>
+                <a16:creationId xmlns:a16="http://schemas.microsoft.com/office/drawing/2014/main" id="{D5E2A888-4371-2C77-8D70-67C5D2A3E50F}"/>
               </a:ext>
             </a:extLst>
           </p:cNvPr>
@@ -8644,7 +8588,7 @@
           <a:p>
             <a:r>
               <a:rPr lang="en-US" dirty="0"/>
-              <a:t>Not in the scope of this workshop</a:t>
+              <a:t>Additional documents for help</a:t>
             </a:r>
           </a:p>
         </p:txBody>
@@ -8654,7 +8598,7 @@
           <p:cNvPr id="3" name="Content Placeholder 2">
             <a:extLst>
               <a:ext uri="{FF2B5EF4-FFF2-40B4-BE49-F238E27FC236}">
-                <a16:creationId xmlns:a16="http://schemas.microsoft.com/office/drawing/2014/main" id="{D6EBAA35-9ADB-AF90-7B25-EAB1DA3F624C}"/>
+                <a16:creationId xmlns:a16="http://schemas.microsoft.com/office/drawing/2014/main" id="{662CC8F7-1286-E21F-DD90-0B000D5F51C8}"/>
               </a:ext>
             </a:extLst>
           </p:cNvPr>
@@ -8665,58 +8609,62 @@
             <p:ph idx="1"/>
           </p:nvPr>
         </p:nvSpPr>
-        <p:spPr/>
+        <p:spPr>
+          <a:xfrm>
+            <a:off x="838200" y="1825625"/>
+            <a:ext cx="10064242" cy="2974975"/>
+          </a:xfrm>
+        </p:spPr>
         <p:txBody>
           <a:bodyPr/>
           <a:lstStyle/>
           <a:p>
-            <a:pPr>
-              <a:lnSpc>
-                <a:spcPct val="150000"/>
-              </a:lnSpc>
-            </a:pPr>
             <a:r>
               <a:rPr lang="en-US" dirty="0"/>
-              <a:t>Advance documents rendering</a:t>
-            </a:r>
-          </a:p>
-          <a:p>
-            <a:pPr>
-              <a:lnSpc>
-                <a:spcPct val="150000"/>
-              </a:lnSpc>
-            </a:pPr>
+              <a:t>R Markdown cheat sheet</a:t>
+            </a:r>
+          </a:p>
+          <a:p>
             <a:r>
               <a:rPr lang="en-US" dirty="0"/>
-              <a:t>Latex codes (some examples will be provided)</a:t>
-            </a:r>
-          </a:p>
-          <a:p>
-            <a:pPr>
-              <a:lnSpc>
-                <a:spcPct val="150000"/>
-              </a:lnSpc>
-            </a:pPr>
-            <a:r>
-              <a:rPr lang="en-US" dirty="0"/>
-              <a:t>Online publishing using markdown</a:t>
-            </a:r>
-          </a:p>
-          <a:p>
-            <a:pPr>
-              <a:lnSpc>
-                <a:spcPct val="150000"/>
-              </a:lnSpc>
-            </a:pPr>
-            <a:r>
-              <a:rPr lang="en-US" dirty="0"/>
-              <a:t>Creating interactive documents using R markdown and shiny</a:t>
-            </a:r>
-          </a:p>
-          <a:p>
-            <a:pPr marL="0" indent="0">
-              <a:buNone/>
-            </a:pPr>
+              <a:t>R Markdown reference manual</a:t>
+            </a:r>
+          </a:p>
+          <a:p>
+            <a:r>
+              <a:rPr lang="en-US" dirty="0">
+                <a:hlinkClick r:id="rId2"/>
+              </a:rPr>
+              <a:t>Composing reproducible manuscripts using R Markdown | Labs | </a:t>
+            </a:r>
+            <a:r>
+              <a:rPr lang="en-US" dirty="0" err="1">
+                <a:hlinkClick r:id="rId2"/>
+              </a:rPr>
+              <a:t>eLife</a:t>
+            </a:r>
+            <a:r>
+              <a:rPr lang="en-US" dirty="0">
+                <a:hlinkClick r:id="rId2"/>
+              </a:rPr>
+              <a:t> (elifesciences.org)</a:t>
+            </a:r>
+            <a:endParaRPr lang="en-US" dirty="0"/>
+          </a:p>
+          <a:p>
+            <a:r>
+              <a:rPr lang="en-IN" dirty="0">
+                <a:hlinkClick r:id="rId3"/>
+              </a:rPr>
+              <a:t>R Markdown: The Definitive Guide (bookdown.org)</a:t>
+            </a:r>
+            <a:endParaRPr lang="en-IN" dirty="0"/>
+          </a:p>
+          <a:p>
+            <a:r>
+              <a:rPr lang="en-IN" dirty="0"/>
+              <a:t>Many more (keeping looking)</a:t>
+            </a:r>
             <a:endParaRPr lang="en-US" dirty="0"/>
           </a:p>
         </p:txBody>
@@ -8724,7 +8672,7 @@
     </p:spTree>
     <p:extLst>
       <p:ext uri="{BB962C8B-B14F-4D97-AF65-F5344CB8AC3E}">
-        <p14:creationId xmlns:p14="http://schemas.microsoft.com/office/powerpoint/2010/main" val="3816386921"/>
+        <p14:creationId xmlns:p14="http://schemas.microsoft.com/office/powerpoint/2010/main" val="3414157185"/>
       </p:ext>
     </p:extLst>
   </p:cSld>
@@ -8756,7 +8704,7 @@
           <p:cNvPr id="2" name="Title 1">
             <a:extLst>
               <a:ext uri="{FF2B5EF4-FFF2-40B4-BE49-F238E27FC236}">
-                <a16:creationId xmlns:a16="http://schemas.microsoft.com/office/drawing/2014/main" id="{321A90D9-14CF-9E11-18CA-04B556619BA9}"/>
+                <a16:creationId xmlns:a16="http://schemas.microsoft.com/office/drawing/2014/main" id="{3DF97B78-35B8-58B0-863F-FF450A62486E}"/>
               </a:ext>
             </a:extLst>
           </p:cNvPr>
@@ -8767,27 +8715,94 @@
             <p:ph type="title"/>
           </p:nvPr>
         </p:nvSpPr>
-        <p:spPr>
-          <a:xfrm>
-            <a:off x="666750" y="2498725"/>
-            <a:ext cx="10064242" cy="1325563"/>
-          </a:xfrm>
-        </p:spPr>
+        <p:spPr/>
         <p:txBody>
           <a:bodyPr/>
           <a:lstStyle/>
           <a:p>
             <a:r>
               <a:rPr lang="en-US" dirty="0"/>
-              <a:t>Setup of the system for the first markdown </a:t>
-            </a:r>
+              <a:t>Not in the scope of this workshop</a:t>
+            </a:r>
+          </a:p>
+        </p:txBody>
+      </p:sp>
+      <p:sp>
+        <p:nvSpPr>
+          <p:cNvPr id="3" name="Content Placeholder 2">
+            <a:extLst>
+              <a:ext uri="{FF2B5EF4-FFF2-40B4-BE49-F238E27FC236}">
+                <a16:creationId xmlns:a16="http://schemas.microsoft.com/office/drawing/2014/main" id="{D6EBAA35-9ADB-AF90-7B25-EAB1DA3F624C}"/>
+              </a:ext>
+            </a:extLst>
+          </p:cNvPr>
+          <p:cNvSpPr>
+            <a:spLocks noGrp="1"/>
+          </p:cNvSpPr>
+          <p:nvPr>
+            <p:ph idx="1"/>
+          </p:nvPr>
+        </p:nvSpPr>
+        <p:spPr/>
+        <p:txBody>
+          <a:bodyPr/>
+          <a:lstStyle/>
+          <a:p>
+            <a:pPr>
+              <a:lnSpc>
+                <a:spcPct val="150000"/>
+              </a:lnSpc>
+            </a:pPr>
+            <a:r>
+              <a:rPr lang="en-US" dirty="0"/>
+              <a:t>Advance documents rendering</a:t>
+            </a:r>
+          </a:p>
+          <a:p>
+            <a:pPr>
+              <a:lnSpc>
+                <a:spcPct val="150000"/>
+              </a:lnSpc>
+            </a:pPr>
+            <a:r>
+              <a:rPr lang="en-US" dirty="0"/>
+              <a:t>Latex codes (some examples will be provided)</a:t>
+            </a:r>
+          </a:p>
+          <a:p>
+            <a:pPr>
+              <a:lnSpc>
+                <a:spcPct val="150000"/>
+              </a:lnSpc>
+            </a:pPr>
+            <a:r>
+              <a:rPr lang="en-US" dirty="0"/>
+              <a:t>Online publishing using markdown</a:t>
+            </a:r>
+          </a:p>
+          <a:p>
+            <a:pPr>
+              <a:lnSpc>
+                <a:spcPct val="150000"/>
+              </a:lnSpc>
+            </a:pPr>
+            <a:r>
+              <a:rPr lang="en-US" dirty="0"/>
+              <a:t>Creating interactive documents using R markdown and shiny</a:t>
+            </a:r>
+          </a:p>
+          <a:p>
+            <a:pPr marL="0" indent="0">
+              <a:buNone/>
+            </a:pPr>
+            <a:endParaRPr lang="en-US" dirty="0"/>
           </a:p>
         </p:txBody>
       </p:sp>
     </p:spTree>
     <p:extLst>
       <p:ext uri="{BB962C8B-B14F-4D97-AF65-F5344CB8AC3E}">
-        <p14:creationId xmlns:p14="http://schemas.microsoft.com/office/powerpoint/2010/main" val="1454302970"/>
+        <p14:creationId xmlns:p14="http://schemas.microsoft.com/office/powerpoint/2010/main" val="3816386921"/>
       </p:ext>
     </p:extLst>
   </p:cSld>
@@ -8819,6 +8834,69 @@
           <p:cNvPr id="2" name="Title 1">
             <a:extLst>
               <a:ext uri="{FF2B5EF4-FFF2-40B4-BE49-F238E27FC236}">
+                <a16:creationId xmlns:a16="http://schemas.microsoft.com/office/drawing/2014/main" id="{321A90D9-14CF-9E11-18CA-04B556619BA9}"/>
+              </a:ext>
+            </a:extLst>
+          </p:cNvPr>
+          <p:cNvSpPr>
+            <a:spLocks noGrp="1"/>
+          </p:cNvSpPr>
+          <p:nvPr>
+            <p:ph type="title"/>
+          </p:nvPr>
+        </p:nvSpPr>
+        <p:spPr>
+          <a:xfrm>
+            <a:off x="666750" y="2498725"/>
+            <a:ext cx="10064242" cy="1325563"/>
+          </a:xfrm>
+        </p:spPr>
+        <p:txBody>
+          <a:bodyPr/>
+          <a:lstStyle/>
+          <a:p>
+            <a:r>
+              <a:rPr lang="en-US" dirty="0"/>
+              <a:t>Setup of the system for the first markdown </a:t>
+            </a:r>
+          </a:p>
+        </p:txBody>
+      </p:sp>
+    </p:spTree>
+    <p:extLst>
+      <p:ext uri="{BB962C8B-B14F-4D97-AF65-F5344CB8AC3E}">
+        <p14:creationId xmlns:p14="http://schemas.microsoft.com/office/powerpoint/2010/main" val="1454302970"/>
+      </p:ext>
+    </p:extLst>
+  </p:cSld>
+  <p:clrMapOvr>
+    <a:masterClrMapping/>
+  </p:clrMapOvr>
+</p:sld>
+</file>
+
+<file path=ppt/slides/slide16.xml><?xml version="1.0" encoding="utf-8"?>
+<p:sld xmlns:a="http://schemas.openxmlformats.org/drawingml/2006/main" xmlns:r="http://schemas.openxmlformats.org/officeDocument/2006/relationships" xmlns:p="http://schemas.openxmlformats.org/presentationml/2006/main">
+  <p:cSld>
+    <p:spTree>
+      <p:nvGrpSpPr>
+        <p:cNvPr id="1" name=""/>
+        <p:cNvGrpSpPr/>
+        <p:nvPr/>
+      </p:nvGrpSpPr>
+      <p:grpSpPr>
+        <a:xfrm>
+          <a:off x="0" y="0"/>
+          <a:ext cx="0" cy="0"/>
+          <a:chOff x="0" y="0"/>
+          <a:chExt cx="0" cy="0"/>
+        </a:xfrm>
+      </p:grpSpPr>
+      <p:sp>
+        <p:nvSpPr>
+          <p:cNvPr id="2" name="Title 1">
+            <a:extLst>
+              <a:ext uri="{FF2B5EF4-FFF2-40B4-BE49-F238E27FC236}">
                 <a16:creationId xmlns:a16="http://schemas.microsoft.com/office/drawing/2014/main" id="{5E6E2D87-1C9B-32CA-0FBB-D60D376B3E46}"/>
               </a:ext>
             </a:extLst>
@@ -8931,7 +9009,7 @@
 </p:sld>
 </file>
 
-<file path=ppt/slides/slide16.xml><?xml version="1.0" encoding="utf-8"?>
+<file path=ppt/slides/slide17.xml><?xml version="1.0" encoding="utf-8"?>
 <p:sld xmlns:a="http://schemas.openxmlformats.org/drawingml/2006/main" xmlns:r="http://schemas.openxmlformats.org/officeDocument/2006/relationships" xmlns:p="http://schemas.openxmlformats.org/presentationml/2006/main">
   <p:cSld>
     <p:spTree>
@@ -9430,7 +9508,7 @@
             </a:r>
             <a:r>
               <a:rPr lang="en-IN" dirty="0"/>
-              <a:t> or VS editor (If can use VS editor, its is OK, but this workshop will use </a:t>
+              <a:t> or VS editor (You can use VS editor, its is OK, but this workshop will use </a:t>
             </a:r>
             <a:r>
               <a:rPr lang="en-IN" dirty="0" err="1"/>
@@ -9473,6 +9551,14 @@
               <a:rPr lang="en-IN" dirty="0"/>
               <a:t> (help to create tables)</a:t>
             </a:r>
+          </a:p>
+          <a:p>
+            <a:pPr lvl="1"/>
+            <a:r>
+              <a:rPr lang="en-IN" dirty="0" err="1"/>
+              <a:t>KabbleExtra</a:t>
+            </a:r>
+            <a:endParaRPr lang="en-IN" dirty="0"/>
           </a:p>
           <a:p>
             <a:pPr lvl="1"/>

</xml_diff>